<commit_message>
Flowchart for the codes
</commit_message>
<xml_diff>
--- a/flowchart/flowchart.pptx
+++ b/flowchart/flowchart.pptx
@@ -104,6 +104,11 @@
       </a:defRPr>
     </a:lvl9pPr>
   </p:defaultTextStyle>
+  <p:extLst>
+    <p:ext uri="{EFAFB233-063F-42B5-8137-9DF3F51BA10A}">
+      <p15:sldGuideLst xmlns:p15="http://schemas.microsoft.com/office/powerpoint/2012/main"/>
+    </p:ext>
+  </p:extLst>
 </p:presentation>
 </file>
 
@@ -5448,6 +5453,42 @@
           </a:p>
         </p:txBody>
       </p:sp>
+      <p:cxnSp>
+        <p:nvCxnSpPr>
+          <p:cNvPr id="6" name="直接箭头连接符 5"/>
+          <p:cNvCxnSpPr>
+            <a:stCxn id="11" idx="2"/>
+            <a:endCxn id="183" idx="0"/>
+          </p:cNvCxnSpPr>
+          <p:nvPr/>
+        </p:nvCxnSpPr>
+        <p:spPr>
+          <a:xfrm>
+            <a:off x="10202584" y="6218022"/>
+            <a:ext cx="0" cy="131042"/>
+          </a:xfrm>
+          <a:prstGeom prst="straightConnector1">
+            <a:avLst/>
+          </a:prstGeom>
+          <a:ln>
+            <a:tailEnd type="triangle"/>
+          </a:ln>
+        </p:spPr>
+        <p:style>
+          <a:lnRef idx="1">
+            <a:schemeClr val="accent1"/>
+          </a:lnRef>
+          <a:fillRef idx="0">
+            <a:schemeClr val="accent1"/>
+          </a:fillRef>
+          <a:effectRef idx="0">
+            <a:schemeClr val="accent1"/>
+          </a:effectRef>
+          <a:fontRef idx="minor">
+            <a:schemeClr val="tx1"/>
+          </a:fontRef>
+        </p:style>
+      </p:cxnSp>
     </p:spTree>
     <p:extLst>
       <p:ext uri="{BB962C8B-B14F-4D97-AF65-F5344CB8AC3E}">

</xml_diff>

<commit_message>
flowchart with reading instructions
</commit_message>
<xml_diff>
--- a/flowchart/flowchart.pptx
+++ b/flowchart/flowchart.pptx
@@ -243,7 +243,7 @@
           <a:p>
             <a:fld id="{710D13BB-A3B2-41C9-B991-0CE9470A6061}" type="datetimeFigureOut">
               <a:rPr lang="en-US" smtClean="0"/>
-              <a:t>6/19/17</a:t>
+              <a:t>7/5/2017</a:t>
             </a:fld>
             <a:endParaRPr lang="en-US"/>
           </a:p>
@@ -413,7 +413,7 @@
           <a:p>
             <a:fld id="{710D13BB-A3B2-41C9-B991-0CE9470A6061}" type="datetimeFigureOut">
               <a:rPr lang="en-US" smtClean="0"/>
-              <a:t>6/19/17</a:t>
+              <a:t>7/5/2017</a:t>
             </a:fld>
             <a:endParaRPr lang="en-US"/>
           </a:p>
@@ -593,7 +593,7 @@
           <a:p>
             <a:fld id="{710D13BB-A3B2-41C9-B991-0CE9470A6061}" type="datetimeFigureOut">
               <a:rPr lang="en-US" smtClean="0"/>
-              <a:t>6/19/17</a:t>
+              <a:t>7/5/2017</a:t>
             </a:fld>
             <a:endParaRPr lang="en-US"/>
           </a:p>
@@ -763,7 +763,7 @@
           <a:p>
             <a:fld id="{710D13BB-A3B2-41C9-B991-0CE9470A6061}" type="datetimeFigureOut">
               <a:rPr lang="en-US" smtClean="0"/>
-              <a:t>6/19/17</a:t>
+              <a:t>7/5/2017</a:t>
             </a:fld>
             <a:endParaRPr lang="en-US"/>
           </a:p>
@@ -1009,7 +1009,7 @@
           <a:p>
             <a:fld id="{710D13BB-A3B2-41C9-B991-0CE9470A6061}" type="datetimeFigureOut">
               <a:rPr lang="en-US" smtClean="0"/>
-              <a:t>6/19/17</a:t>
+              <a:t>7/5/2017</a:t>
             </a:fld>
             <a:endParaRPr lang="en-US"/>
           </a:p>
@@ -1241,7 +1241,7 @@
           <a:p>
             <a:fld id="{710D13BB-A3B2-41C9-B991-0CE9470A6061}" type="datetimeFigureOut">
               <a:rPr lang="en-US" smtClean="0"/>
-              <a:t>6/19/17</a:t>
+              <a:t>7/5/2017</a:t>
             </a:fld>
             <a:endParaRPr lang="en-US"/>
           </a:p>
@@ -1608,7 +1608,7 @@
           <a:p>
             <a:fld id="{710D13BB-A3B2-41C9-B991-0CE9470A6061}" type="datetimeFigureOut">
               <a:rPr lang="en-US" smtClean="0"/>
-              <a:t>6/19/17</a:t>
+              <a:t>7/5/2017</a:t>
             </a:fld>
             <a:endParaRPr lang="en-US"/>
           </a:p>
@@ -1726,7 +1726,7 @@
           <a:p>
             <a:fld id="{710D13BB-A3B2-41C9-B991-0CE9470A6061}" type="datetimeFigureOut">
               <a:rPr lang="en-US" smtClean="0"/>
-              <a:t>6/19/17</a:t>
+              <a:t>7/5/2017</a:t>
             </a:fld>
             <a:endParaRPr lang="en-US"/>
           </a:p>
@@ -1821,7 +1821,7 @@
           <a:p>
             <a:fld id="{710D13BB-A3B2-41C9-B991-0CE9470A6061}" type="datetimeFigureOut">
               <a:rPr lang="en-US" smtClean="0"/>
-              <a:t>6/19/17</a:t>
+              <a:t>7/5/2017</a:t>
             </a:fld>
             <a:endParaRPr lang="en-US"/>
           </a:p>
@@ -2098,7 +2098,7 @@
           <a:p>
             <a:fld id="{710D13BB-A3B2-41C9-B991-0CE9470A6061}" type="datetimeFigureOut">
               <a:rPr lang="en-US" smtClean="0"/>
-              <a:t>6/19/17</a:t>
+              <a:t>7/5/2017</a:t>
             </a:fld>
             <a:endParaRPr lang="en-US"/>
           </a:p>
@@ -2351,7 +2351,7 @@
           <a:p>
             <a:fld id="{710D13BB-A3B2-41C9-B991-0CE9470A6061}" type="datetimeFigureOut">
               <a:rPr lang="en-US" smtClean="0"/>
-              <a:t>6/19/17</a:t>
+              <a:t>7/5/2017</a:t>
             </a:fld>
             <a:endParaRPr lang="en-US"/>
           </a:p>
@@ -2564,7 +2564,7 @@
           <a:p>
             <a:fld id="{710D13BB-A3B2-41C9-B991-0CE9470A6061}" type="datetimeFigureOut">
               <a:rPr lang="en-US" smtClean="0"/>
-              <a:t>6/19/17</a:t>
+              <a:t>7/5/2017</a:t>
             </a:fld>
             <a:endParaRPr lang="en-US"/>
           </a:p>
@@ -3417,7 +3417,7 @@
         </p:nvSpPr>
         <p:spPr>
           <a:xfrm>
-            <a:off x="2214612" y="2057131"/>
+            <a:off x="2214611" y="1976540"/>
             <a:ext cx="2110971" cy="457200"/>
           </a:xfrm>
           <a:prstGeom prst="rect">
@@ -3663,8 +3663,8 @@
         </p:nvCxnSpPr>
         <p:spPr>
           <a:xfrm flipH="1">
-            <a:off x="4325583" y="1717586"/>
-            <a:ext cx="402944" cy="568145"/>
+            <a:off x="4325582" y="1717586"/>
+            <a:ext cx="402945" cy="487554"/>
           </a:xfrm>
           <a:prstGeom prst="straightConnector1">
             <a:avLst/>
@@ -3734,9 +3734,9 @@
           <p:nvPr/>
         </p:nvCxnSpPr>
         <p:spPr>
-          <a:xfrm flipH="1">
-            <a:off x="3270097" y="2514331"/>
-            <a:ext cx="1" cy="265680"/>
+          <a:xfrm>
+            <a:off x="3270097" y="2433740"/>
+            <a:ext cx="0" cy="346270"/>
           </a:xfrm>
           <a:prstGeom prst="straightConnector1">
             <a:avLst/>
@@ -3768,8 +3768,8 @@
         </p:nvSpPr>
         <p:spPr>
           <a:xfrm>
-            <a:off x="2355697" y="2780011"/>
-            <a:ext cx="1828800" cy="457200"/>
+            <a:off x="2355697" y="2780010"/>
+            <a:ext cx="1828800" cy="880995"/>
           </a:xfrm>
           <a:prstGeom prst="rect">
             <a:avLst/>
@@ -3808,7 +3808,15 @@
                   <a:schemeClr val="tx1"/>
                 </a:solidFill>
               </a:rPr>
-              <a:t>Damage on each node</a:t>
+              <a:t>Simulated damage </a:t>
+            </a:r>
+            <a:r>
+              <a:rPr lang="en-US" dirty="0" smtClean="0">
+                <a:solidFill>
+                  <a:schemeClr val="tx1"/>
+                </a:solidFill>
+              </a:rPr>
+              <a:t>on each node</a:t>
             </a:r>
             <a:endParaRPr lang="en-US" dirty="0">
               <a:solidFill>
@@ -3884,7 +3892,7 @@
         </p:nvSpPr>
         <p:spPr>
           <a:xfrm>
-            <a:off x="2355697" y="3455511"/>
+            <a:off x="2370640" y="3889606"/>
             <a:ext cx="1828800" cy="457200"/>
           </a:xfrm>
           <a:prstGeom prst="rect">
@@ -3942,7 +3950,7 @@
         </p:nvSpPr>
         <p:spPr>
           <a:xfrm>
-            <a:off x="6858013" y="3455256"/>
+            <a:off x="6858013" y="3889606"/>
             <a:ext cx="1828800" cy="457200"/>
           </a:xfrm>
           <a:prstGeom prst="rect">
@@ -4076,7 +4084,7 @@
         <p:spPr>
           <a:xfrm flipV="1">
             <a:off x="4184497" y="2998056"/>
-            <a:ext cx="544030" cy="10555"/>
+            <a:ext cx="544030" cy="222452"/>
           </a:xfrm>
           <a:prstGeom prst="straightConnector1">
             <a:avLst/>
@@ -4111,8 +4119,8 @@
         </p:nvCxnSpPr>
         <p:spPr>
           <a:xfrm flipH="1">
-            <a:off x="4184497" y="3226656"/>
-            <a:ext cx="1458430" cy="457455"/>
+            <a:off x="4199440" y="3226656"/>
+            <a:ext cx="1443487" cy="891550"/>
           </a:xfrm>
           <a:prstGeom prst="straightConnector1">
             <a:avLst/>
@@ -4148,7 +4156,7 @@
         <p:spPr>
           <a:xfrm>
             <a:off x="5642927" y="3226656"/>
-            <a:ext cx="1215086" cy="457200"/>
+            <a:ext cx="1215086" cy="891550"/>
           </a:xfrm>
           <a:prstGeom prst="straightConnector1">
             <a:avLst/>
@@ -4592,8 +4600,8 @@
         </p:nvCxnSpPr>
         <p:spPr>
           <a:xfrm>
-            <a:off x="3270097" y="3912711"/>
-            <a:ext cx="14943" cy="891295"/>
+            <a:off x="3285040" y="4346806"/>
+            <a:ext cx="0" cy="457200"/>
           </a:xfrm>
           <a:prstGeom prst="straightConnector1">
             <a:avLst/>
@@ -4628,8 +4636,8 @@
         </p:nvCxnSpPr>
         <p:spPr>
           <a:xfrm>
-            <a:off x="7772413" y="3912456"/>
-            <a:ext cx="0" cy="891550"/>
+            <a:off x="7772413" y="4346806"/>
+            <a:ext cx="0" cy="457200"/>
           </a:xfrm>
           <a:prstGeom prst="straightConnector1">
             <a:avLst/>
@@ -4777,8 +4785,8 @@
         </p:nvSpPr>
         <p:spPr>
           <a:xfrm>
-            <a:off x="4728527" y="4804006"/>
-            <a:ext cx="1828800" cy="457200"/>
+            <a:off x="4728527" y="4646139"/>
+            <a:ext cx="1828800" cy="782595"/>
           </a:xfrm>
           <a:prstGeom prst="rect">
             <a:avLst/>
@@ -4817,7 +4825,15 @@
                   <a:schemeClr val="tx1"/>
                 </a:solidFill>
               </a:rPr>
-              <a:t>Damage on each node</a:t>
+              <a:t>Interpolated damage </a:t>
+            </a:r>
+            <a:r>
+              <a:rPr lang="en-US" dirty="0" smtClean="0">
+                <a:solidFill>
+                  <a:schemeClr val="tx1"/>
+                </a:solidFill>
+              </a:rPr>
+              <a:t>on each node</a:t>
             </a:r>
             <a:endParaRPr lang="en-US" dirty="0">
               <a:solidFill>
@@ -4947,7 +4963,7 @@
         <p:spPr>
           <a:xfrm>
             <a:off x="4199440" y="5032606"/>
-            <a:ext cx="529087" cy="0"/>
+            <a:ext cx="529087" cy="4831"/>
           </a:xfrm>
           <a:prstGeom prst="straightConnector1">
             <a:avLst/>
@@ -4981,9 +4997,9 @@
           <p:nvPr/>
         </p:nvCxnSpPr>
         <p:spPr>
-          <a:xfrm>
+          <a:xfrm flipV="1">
             <a:off x="6557327" y="5032606"/>
-            <a:ext cx="300686" cy="0"/>
+            <a:ext cx="300686" cy="4831"/>
           </a:xfrm>
           <a:prstGeom prst="straightConnector1">
             <a:avLst/>
@@ -5489,6 +5505,56 @@
           </a:fontRef>
         </p:style>
       </p:cxnSp>
+      <p:sp>
+        <p:nvSpPr>
+          <p:cNvPr id="30" name="TextBox 29"/>
+          <p:cNvSpPr txBox="1"/>
+          <p:nvPr/>
+        </p:nvSpPr>
+        <p:spPr>
+          <a:xfrm>
+            <a:off x="337751" y="74141"/>
+            <a:ext cx="3402227" cy="553998"/>
+          </a:xfrm>
+          <a:prstGeom prst="rect">
+            <a:avLst/>
+          </a:prstGeom>
+          <a:noFill/>
+        </p:spPr>
+        <p:txBody>
+          <a:bodyPr wrap="square" rtlCol="0">
+            <a:spAutoFit/>
+          </a:bodyPr>
+          <a:lstStyle/>
+          <a:p>
+            <a:r>
+              <a:rPr lang="en-US" sz="1000" dirty="0" smtClean="0"/>
+              <a:t>1. dashed blocks -- inputs and outputs</a:t>
+            </a:r>
+          </a:p>
+          <a:p>
+            <a:r>
+              <a:rPr lang="en-US" sz="1000" dirty="0" smtClean="0"/>
+              <a:t>2. </a:t>
+            </a:r>
+            <a:r>
+              <a:rPr lang="en-US" sz="1000" dirty="0"/>
+              <a:t>s</a:t>
+            </a:r>
+            <a:r>
+              <a:rPr lang="en-US" sz="1000" dirty="0" smtClean="0"/>
+              <a:t>olid blocks – python files</a:t>
+            </a:r>
+          </a:p>
+          <a:p>
+            <a:r>
+              <a:rPr lang="en-US" sz="1000" dirty="0" smtClean="0"/>
+              <a:t>3. Bold solid blocks – outputs of the model</a:t>
+            </a:r>
+            <a:endParaRPr lang="en-US" sz="1000" dirty="0"/>
+          </a:p>
+        </p:txBody>
+      </p:sp>
     </p:spTree>
     <p:extLst>
       <p:ext uri="{BB962C8B-B14F-4D97-AF65-F5344CB8AC3E}">

</xml_diff>